<commit_message>
Update UML for model
</commit_message>
<xml_diff>
--- a/docs/diagrams/ModelComponentClassDiagram.pptx
+++ b/docs/diagrams/ModelComponentClassDiagram.pptx
@@ -208,7 +208,7 @@
           <a:p>
             <a:fld id="{F5CC4B3F-88C1-4FFA-B1B6-F41C21DC6924}" type="datetimeFigureOut">
               <a:rPr lang="en-US" smtClean="0"/>
-              <a:t>6/27/2018</a:t>
+              <a:t>11/12/2018</a:t>
             </a:fld>
             <a:endParaRPr lang="en-US"/>
           </a:p>
@@ -654,7 +654,7 @@
           <a:p>
             <a:fld id="{78C97017-6FC3-485B-9764-EAC9E56C1D49}" type="datetimeFigureOut">
               <a:rPr lang="en-US" smtClean="0"/>
-              <a:t>6/27/2018</a:t>
+              <a:t>11/12/2018</a:t>
             </a:fld>
             <a:endParaRPr lang="en-US"/>
           </a:p>
@@ -822,7 +822,7 @@
           <a:p>
             <a:fld id="{78C97017-6FC3-485B-9764-EAC9E56C1D49}" type="datetimeFigureOut">
               <a:rPr lang="en-US" smtClean="0"/>
-              <a:t>6/27/2018</a:t>
+              <a:t>11/12/2018</a:t>
             </a:fld>
             <a:endParaRPr lang="en-US"/>
           </a:p>
@@ -1000,7 +1000,7 @@
           <a:p>
             <a:fld id="{78C97017-6FC3-485B-9764-EAC9E56C1D49}" type="datetimeFigureOut">
               <a:rPr lang="en-US" smtClean="0"/>
-              <a:t>6/27/2018</a:t>
+              <a:t>11/12/2018</a:t>
             </a:fld>
             <a:endParaRPr lang="en-US"/>
           </a:p>
@@ -1168,7 +1168,7 @@
           <a:p>
             <a:fld id="{78C97017-6FC3-485B-9764-EAC9E56C1D49}" type="datetimeFigureOut">
               <a:rPr lang="en-US" smtClean="0"/>
-              <a:t>6/27/2018</a:t>
+              <a:t>11/12/2018</a:t>
             </a:fld>
             <a:endParaRPr lang="en-US"/>
           </a:p>
@@ -1413,7 +1413,7 @@
           <a:p>
             <a:fld id="{78C97017-6FC3-485B-9764-EAC9E56C1D49}" type="datetimeFigureOut">
               <a:rPr lang="en-US" smtClean="0"/>
-              <a:t>6/27/2018</a:t>
+              <a:t>11/12/2018</a:t>
             </a:fld>
             <a:endParaRPr lang="en-US"/>
           </a:p>
@@ -1698,7 +1698,7 @@
           <a:p>
             <a:fld id="{78C97017-6FC3-485B-9764-EAC9E56C1D49}" type="datetimeFigureOut">
               <a:rPr lang="en-US" smtClean="0"/>
-              <a:t>6/27/2018</a:t>
+              <a:t>11/12/2018</a:t>
             </a:fld>
             <a:endParaRPr lang="en-US"/>
           </a:p>
@@ -2117,7 +2117,7 @@
           <a:p>
             <a:fld id="{78C97017-6FC3-485B-9764-EAC9E56C1D49}" type="datetimeFigureOut">
               <a:rPr lang="en-US" smtClean="0"/>
-              <a:t>6/27/2018</a:t>
+              <a:t>11/12/2018</a:t>
             </a:fld>
             <a:endParaRPr lang="en-US"/>
           </a:p>
@@ -2234,7 +2234,7 @@
           <a:p>
             <a:fld id="{78C97017-6FC3-485B-9764-EAC9E56C1D49}" type="datetimeFigureOut">
               <a:rPr lang="en-US" smtClean="0"/>
-              <a:t>6/27/2018</a:t>
+              <a:t>11/12/2018</a:t>
             </a:fld>
             <a:endParaRPr lang="en-US"/>
           </a:p>
@@ -2329,7 +2329,7 @@
           <a:p>
             <a:fld id="{78C97017-6FC3-485B-9764-EAC9E56C1D49}" type="datetimeFigureOut">
               <a:rPr lang="en-US" smtClean="0"/>
-              <a:t>6/27/2018</a:t>
+              <a:t>11/12/2018</a:t>
             </a:fld>
             <a:endParaRPr lang="en-US"/>
           </a:p>
@@ -2604,7 +2604,7 @@
           <a:p>
             <a:fld id="{78C97017-6FC3-485B-9764-EAC9E56C1D49}" type="datetimeFigureOut">
               <a:rPr lang="en-US" smtClean="0"/>
-              <a:t>6/27/2018</a:t>
+              <a:t>11/12/2018</a:t>
             </a:fld>
             <a:endParaRPr lang="en-US"/>
           </a:p>
@@ -2856,7 +2856,7 @@
           <a:p>
             <a:fld id="{78C97017-6FC3-485B-9764-EAC9E56C1D49}" type="datetimeFigureOut">
               <a:rPr lang="en-US" smtClean="0"/>
-              <a:t>6/27/2018</a:t>
+              <a:t>11/12/2018</a:t>
             </a:fld>
             <a:endParaRPr lang="en-US"/>
           </a:p>
@@ -3067,7 +3067,7 @@
           <a:p>
             <a:fld id="{78C97017-6FC3-485B-9764-EAC9E56C1D49}" type="datetimeFigureOut">
               <a:rPr lang="en-US" smtClean="0"/>
-              <a:t>6/27/2018</a:t>
+              <a:t>11/12/2018</a:t>
             </a:fld>
             <a:endParaRPr lang="en-US"/>
           </a:p>
@@ -3450,8 +3450,8 @@
         </p:nvSpPr>
         <p:spPr>
           <a:xfrm>
-            <a:off x="1119865" y="1600200"/>
-            <a:ext cx="7490735" cy="3124200"/>
+            <a:off x="909852" y="1632100"/>
+            <a:ext cx="7772400" cy="4182420"/>
           </a:xfrm>
           <a:prstGeom prst="roundRect">
             <a:avLst>
@@ -3570,8 +3570,8 @@
         </p:nvSpPr>
         <p:spPr>
           <a:xfrm rot="16200000">
-            <a:off x="1661548" y="3097750"/>
-            <a:ext cx="1093635" cy="346760"/>
+            <a:off x="1228410" y="3530888"/>
+            <a:ext cx="1969043" cy="355892"/>
           </a:xfrm>
           <a:prstGeom prst="rect">
             <a:avLst/>
@@ -3626,19 +3626,19 @@
           <p:cNvPr id="107" name="Elbow Connector 106"/>
           <p:cNvCxnSpPr>
             <a:cxnSpLocks/>
-            <a:stCxn id="9" idx="1"/>
-            <a:endCxn id="62" idx="2"/>
+            <a:stCxn id="9" idx="3"/>
+            <a:endCxn id="62" idx="0"/>
           </p:cNvCxnSpPr>
           <p:nvPr/>
         </p:nvCxnSpPr>
         <p:spPr>
-          <a:xfrm rot="5400000" flipH="1" flipV="1">
-            <a:off x="4131507" y="1281685"/>
-            <a:ext cx="613122" cy="4459404"/>
+          <a:xfrm rot="16200000" flipH="1">
+            <a:off x="4373474" y="563770"/>
+            <a:ext cx="133753" cy="4454838"/>
           </a:xfrm>
           <a:prstGeom prst="bentConnector3">
             <a:avLst>
-              <a:gd name="adj1" fmla="val -26668"/>
+              <a:gd name="adj1" fmla="val -70912"/>
             </a:avLst>
           </a:prstGeom>
           <a:ln w="19050">
@@ -3994,7 +3994,7 @@
           <a:p>
             <a:pPr algn="ctr"/>
             <a:r>
-              <a:rPr lang="en-US" sz="1050" dirty="0" err="1" smtClean="0">
+              <a:rPr lang="en-US" sz="1050" dirty="0" err="1">
                 <a:solidFill>
                   <a:srgbClr val="7030A0"/>
                 </a:solidFill>
@@ -4104,7 +4104,7 @@
         <p:spPr>
           <a:xfrm>
             <a:off x="4692650" y="2846162"/>
-            <a:ext cx="1156969" cy="346760"/>
+            <a:ext cx="1224317" cy="346760"/>
           </a:xfrm>
           <a:prstGeom prst="rect">
             <a:avLst/>
@@ -4141,7 +4141,7 @@
                   <a:srgbClr val="7030A0"/>
                 </a:solidFill>
               </a:rPr>
-              <a:t>UniquePersonList</a:t>
+              <a:t>UniqueStudentList</a:t>
             </a:r>
             <a:endParaRPr lang="en-SG" sz="1050" dirty="0">
               <a:solidFill>
@@ -4244,7 +4244,7 @@
                   <a:srgbClr val="7030A0"/>
                 </a:solidFill>
               </a:rPr>
-              <a:t>Person</a:t>
+              <a:t>Student</a:t>
             </a:r>
             <a:endParaRPr lang="en-SG" sz="1050" dirty="0">
               <a:solidFill>
@@ -4262,8 +4262,8 @@
         </p:nvSpPr>
         <p:spPr>
           <a:xfrm>
-            <a:off x="5858751" y="2941676"/>
-            <a:ext cx="236048" cy="173380"/>
+            <a:off x="5916967" y="2941676"/>
+            <a:ext cx="177832" cy="152236"/>
           </a:xfrm>
           <a:prstGeom prst="flowChartDecision">
             <a:avLst/>
@@ -4303,15 +4303,15 @@
         <p:nvCxnSpPr>
           <p:cNvPr id="64" name="Elbow Connector 63"/>
           <p:cNvCxnSpPr>
+            <a:cxnSpLocks/>
             <a:stCxn id="63" idx="3"/>
-            <a:endCxn id="62" idx="1"/>
           </p:cNvCxnSpPr>
           <p:nvPr/>
         </p:nvCxnSpPr>
         <p:spPr>
           <a:xfrm>
-            <a:off x="6094799" y="3028366"/>
-            <a:ext cx="218878" cy="3080"/>
+            <a:off x="6094799" y="3017794"/>
+            <a:ext cx="213102" cy="1748"/>
           </a:xfrm>
           <a:prstGeom prst="bentConnector3">
             <a:avLst/>
@@ -4524,18 +4524,13 @@
           <a:p>
             <a:pPr algn="ctr"/>
             <a:r>
-              <a:rPr lang="en-US" sz="1050" dirty="0">
+              <a:rPr lang="en-SG" sz="1050" dirty="0">
                 <a:solidFill>
                   <a:srgbClr val="7030A0"/>
                 </a:solidFill>
               </a:rPr>
-              <a:t>Phone</a:t>
-            </a:r>
-            <a:endParaRPr lang="en-SG" sz="1050" dirty="0">
-              <a:solidFill>
-                <a:srgbClr val="7030A0"/>
-              </a:solidFill>
-            </a:endParaRPr>
+              <a:t>Student Number</a:t>
+            </a:r>
           </a:p>
         </p:txBody>
       </p:sp>
@@ -4723,7 +4718,7 @@
                   <a:srgbClr val="7030A0"/>
                 </a:solidFill>
               </a:rPr>
-              <a:t>Address</a:t>
+              <a:t>Faculty</a:t>
             </a:r>
             <a:endParaRPr lang="en-SG" sz="1050" dirty="0">
               <a:solidFill>
@@ -4943,8 +4938,8 @@
           <p:nvPr/>
         </p:nvSpPr>
         <p:spPr>
-          <a:xfrm rot="16200000">
-            <a:off x="6362886" y="3586305"/>
+          <a:xfrm>
+            <a:off x="5615131" y="2385787"/>
             <a:ext cx="881018" cy="261610"/>
           </a:xfrm>
           <a:prstGeom prst="rect">
@@ -4983,8 +4978,8 @@
         </p:nvSpPr>
         <p:spPr>
           <a:xfrm>
-            <a:off x="2057401" y="4239491"/>
-            <a:ext cx="1066800" cy="346760"/>
+            <a:off x="910091" y="3883599"/>
+            <a:ext cx="1032363" cy="383594"/>
           </a:xfrm>
           <a:prstGeom prst="rect">
             <a:avLst/>
@@ -5023,16 +5018,8 @@
               </a:rPr>
               <a:t>&lt;&lt;interface&gt;&gt;</a:t>
             </a:r>
-            <a:r>
-              <a:rPr lang="en-US" sz="1050">
-                <a:solidFill>
-                  <a:srgbClr val="7030A0"/>
-                </a:solidFill>
-              </a:rPr>
-              <a:t/>
-            </a:r>
             <a:br>
-              <a:rPr lang="en-US" sz="1050">
+              <a:rPr lang="en-US" sz="1050" dirty="0">
                 <a:solidFill>
                   <a:srgbClr val="7030A0"/>
                 </a:solidFill>
@@ -5058,18 +5045,21 @@
         <p:nvCxnSpPr>
           <p:cNvPr id="124" name="Elbow Connector 122"/>
           <p:cNvCxnSpPr>
+            <a:cxnSpLocks/>
             <a:stCxn id="119" idx="1"/>
-            <a:endCxn id="122" idx="1"/>
+            <a:endCxn id="122" idx="0"/>
           </p:cNvCxnSpPr>
           <p:nvPr/>
         </p:nvCxnSpPr>
         <p:spPr>
-          <a:xfrm rot="16200000" flipH="1">
-            <a:off x="1364475" y="3719944"/>
-            <a:ext cx="831471" cy="554381"/>
-          </a:xfrm>
-          <a:prstGeom prst="bentConnector2">
-            <a:avLst/>
+          <a:xfrm rot="5400000">
+            <a:off x="1313548" y="3694126"/>
+            <a:ext cx="302199" cy="76747"/>
+          </a:xfrm>
+          <a:prstGeom prst="bentConnector3">
+            <a:avLst>
+              <a:gd name="adj1" fmla="val 50000"/>
+            </a:avLst>
           </a:prstGeom>
           <a:ln w="19050">
             <a:solidFill>
@@ -5260,7 +5250,7 @@
         </p:nvSpPr>
         <p:spPr>
           <a:xfrm>
-            <a:off x="6449896" y="3204826"/>
+            <a:off x="6675515" y="2638751"/>
             <a:ext cx="189257" cy="178683"/>
           </a:xfrm>
           <a:prstGeom prst="rect">
@@ -5508,6 +5498,7 @@
         <p:nvCxnSpPr>
           <p:cNvPr id="60" name="Straight Arrow Connector 59"/>
           <p:cNvCxnSpPr>
+            <a:cxnSpLocks/>
             <a:stCxn id="51" idx="1"/>
             <a:endCxn id="49" idx="1"/>
           </p:cNvCxnSpPr>
@@ -5610,6 +5601,1812 @@
           <a:xfrm>
             <a:off x="2898289" y="2177727"/>
             <a:ext cx="271892" cy="2821"/>
+          </a:xfrm>
+          <a:prstGeom prst="bentConnector3">
+            <a:avLst>
+              <a:gd name="adj1" fmla="val 50000"/>
+            </a:avLst>
+          </a:prstGeom>
+          <a:ln w="19050">
+            <a:solidFill>
+              <a:srgbClr val="7030A0"/>
+            </a:solidFill>
+            <a:prstDash val="sysDot"/>
+            <a:headEnd type="none" w="med" len="med"/>
+            <a:tailEnd type="none" w="med" len="med"/>
+          </a:ln>
+          <a:effectLst/>
+        </p:spPr>
+        <p:style>
+          <a:lnRef idx="1">
+            <a:schemeClr val="accent2"/>
+          </a:lnRef>
+          <a:fillRef idx="2">
+            <a:schemeClr val="accent2"/>
+          </a:fillRef>
+          <a:effectRef idx="1">
+            <a:schemeClr val="accent2"/>
+          </a:effectRef>
+          <a:fontRef idx="minor">
+            <a:schemeClr val="dk1"/>
+          </a:fontRef>
+        </p:style>
+      </p:cxnSp>
+      <p:sp>
+        <p:nvSpPr>
+          <p:cNvPr id="67" name="Flowchart: Decision 96">
+            <a:extLst>
+              <a:ext uri="{FF2B5EF4-FFF2-40B4-BE49-F238E27FC236}">
+                <a16:creationId xmlns:a16="http://schemas.microsoft.com/office/drawing/2014/main" id="{DD7E5D46-AE8B-40C7-9BDC-2E9E7CCEE96B}"/>
+              </a:ext>
+            </a:extLst>
+          </p:cNvPr>
+          <p:cNvSpPr/>
+          <p:nvPr/>
+        </p:nvSpPr>
+        <p:spPr>
+          <a:xfrm>
+            <a:off x="2380315" y="4162311"/>
+            <a:ext cx="236048" cy="173380"/>
+          </a:xfrm>
+          <a:prstGeom prst="flowChartDecision">
+            <a:avLst/>
+          </a:prstGeom>
+          <a:noFill/>
+          <a:ln w="19050">
+            <a:solidFill>
+              <a:srgbClr val="7030A0"/>
+            </a:solidFill>
+          </a:ln>
+          <a:effectLst/>
+        </p:spPr>
+        <p:style>
+          <a:lnRef idx="1">
+            <a:schemeClr val="accent6"/>
+          </a:lnRef>
+          <a:fillRef idx="2">
+            <a:schemeClr val="accent6"/>
+          </a:fillRef>
+          <a:effectRef idx="1">
+            <a:schemeClr val="accent6"/>
+          </a:effectRef>
+          <a:fontRef idx="minor">
+            <a:schemeClr val="dk1"/>
+          </a:fontRef>
+        </p:style>
+        <p:txBody>
+          <a:bodyPr rtlCol="0" anchor="ctr"/>
+          <a:lstStyle/>
+          <a:p>
+            <a:pPr algn="ctr"/>
+            <a:endParaRPr lang="en-US" sz="1050"/>
+          </a:p>
+        </p:txBody>
+      </p:sp>
+      <p:sp>
+        <p:nvSpPr>
+          <p:cNvPr id="72" name="Rectangle 8">
+            <a:extLst>
+              <a:ext uri="{FF2B5EF4-FFF2-40B4-BE49-F238E27FC236}">
+                <a16:creationId xmlns:a16="http://schemas.microsoft.com/office/drawing/2014/main" id="{127663C9-C2D3-4C24-9106-C72CF96544AC}"/>
+              </a:ext>
+            </a:extLst>
+          </p:cNvPr>
+          <p:cNvSpPr/>
+          <p:nvPr/>
+        </p:nvSpPr>
+        <p:spPr>
+          <a:xfrm>
+            <a:off x="2825280" y="4094796"/>
+            <a:ext cx="1490560" cy="334856"/>
+          </a:xfrm>
+          <a:prstGeom prst="rect">
+            <a:avLst/>
+          </a:prstGeom>
+          <a:ln w="19050">
+            <a:solidFill>
+              <a:srgbClr val="7030A0"/>
+            </a:solidFill>
+          </a:ln>
+          <a:effectLst/>
+        </p:spPr>
+        <p:style>
+          <a:lnRef idx="1">
+            <a:schemeClr val="accent4"/>
+          </a:lnRef>
+          <a:fillRef idx="2">
+            <a:schemeClr val="accent4"/>
+          </a:fillRef>
+          <a:effectRef idx="1">
+            <a:schemeClr val="accent4"/>
+          </a:effectRef>
+          <a:fontRef idx="minor">
+            <a:schemeClr val="dk1"/>
+          </a:fontRef>
+        </p:style>
+        <p:txBody>
+          <a:bodyPr rtlCol="0" anchor="ctr"/>
+          <a:lstStyle/>
+          <a:p>
+            <a:pPr algn="ctr"/>
+            <a:r>
+              <a:rPr lang="en-US" sz="1050" dirty="0" err="1">
+                <a:solidFill>
+                  <a:srgbClr val="7030A0"/>
+                </a:solidFill>
+              </a:rPr>
+              <a:t>VersionedCalendar</a:t>
+            </a:r>
+            <a:endParaRPr lang="en-SG" sz="1050" dirty="0">
+              <a:solidFill>
+                <a:srgbClr val="7030A0"/>
+              </a:solidFill>
+            </a:endParaRPr>
+          </a:p>
+        </p:txBody>
+      </p:sp>
+      <p:sp>
+        <p:nvSpPr>
+          <p:cNvPr id="73" name="Rectangle 8">
+            <a:extLst>
+              <a:ext uri="{FF2B5EF4-FFF2-40B4-BE49-F238E27FC236}">
+                <a16:creationId xmlns:a16="http://schemas.microsoft.com/office/drawing/2014/main" id="{1B22BDFB-CDB9-47E4-85AC-AEB381A20CD3}"/>
+              </a:ext>
+            </a:extLst>
+          </p:cNvPr>
+          <p:cNvSpPr/>
+          <p:nvPr/>
+        </p:nvSpPr>
+        <p:spPr>
+          <a:xfrm>
+            <a:off x="4688694" y="4104266"/>
+            <a:ext cx="1224317" cy="346760"/>
+          </a:xfrm>
+          <a:prstGeom prst="rect">
+            <a:avLst/>
+          </a:prstGeom>
+          <a:ln w="19050">
+            <a:solidFill>
+              <a:srgbClr val="7030A0"/>
+            </a:solidFill>
+          </a:ln>
+          <a:effectLst/>
+        </p:spPr>
+        <p:style>
+          <a:lnRef idx="1">
+            <a:schemeClr val="accent4"/>
+          </a:lnRef>
+          <a:fillRef idx="2">
+            <a:schemeClr val="accent4"/>
+          </a:fillRef>
+          <a:effectRef idx="1">
+            <a:schemeClr val="accent4"/>
+          </a:effectRef>
+          <a:fontRef idx="minor">
+            <a:schemeClr val="dk1"/>
+          </a:fontRef>
+        </p:style>
+        <p:txBody>
+          <a:bodyPr rtlCol="0" anchor="ctr"/>
+          <a:lstStyle/>
+          <a:p>
+            <a:pPr algn="ctr"/>
+            <a:r>
+              <a:rPr lang="en-US" sz="1050" dirty="0" err="1">
+                <a:solidFill>
+                  <a:srgbClr val="7030A0"/>
+                </a:solidFill>
+              </a:rPr>
+              <a:t>UniqueEventList</a:t>
+            </a:r>
+            <a:endParaRPr lang="en-SG" sz="1050" dirty="0">
+              <a:solidFill>
+                <a:srgbClr val="7030A0"/>
+              </a:solidFill>
+            </a:endParaRPr>
+          </a:p>
+        </p:txBody>
+      </p:sp>
+      <p:sp>
+        <p:nvSpPr>
+          <p:cNvPr id="74" name="Rectangle 8">
+            <a:extLst>
+              <a:ext uri="{FF2B5EF4-FFF2-40B4-BE49-F238E27FC236}">
+                <a16:creationId xmlns:a16="http://schemas.microsoft.com/office/drawing/2014/main" id="{63D23FFD-2670-40F7-AEA3-20EA39F0A6D4}"/>
+              </a:ext>
+            </a:extLst>
+          </p:cNvPr>
+          <p:cNvSpPr/>
+          <p:nvPr/>
+        </p:nvSpPr>
+        <p:spPr>
+          <a:xfrm>
+            <a:off x="6293775" y="4121721"/>
+            <a:ext cx="708186" cy="346760"/>
+          </a:xfrm>
+          <a:prstGeom prst="rect">
+            <a:avLst/>
+          </a:prstGeom>
+          <a:ln w="19050">
+            <a:solidFill>
+              <a:srgbClr val="7030A0"/>
+            </a:solidFill>
+          </a:ln>
+          <a:effectLst/>
+        </p:spPr>
+        <p:style>
+          <a:lnRef idx="1">
+            <a:schemeClr val="accent4"/>
+          </a:lnRef>
+          <a:fillRef idx="2">
+            <a:schemeClr val="accent4"/>
+          </a:fillRef>
+          <a:effectRef idx="1">
+            <a:schemeClr val="accent4"/>
+          </a:effectRef>
+          <a:fontRef idx="minor">
+            <a:schemeClr val="dk1"/>
+          </a:fontRef>
+        </p:style>
+        <p:txBody>
+          <a:bodyPr rtlCol="0" anchor="ctr"/>
+          <a:lstStyle/>
+          <a:p>
+            <a:pPr algn="ctr"/>
+            <a:r>
+              <a:rPr lang="en-US" sz="1050" dirty="0">
+                <a:solidFill>
+                  <a:srgbClr val="7030A0"/>
+                </a:solidFill>
+              </a:rPr>
+              <a:t>Event</a:t>
+            </a:r>
+            <a:endParaRPr lang="en-SG" sz="1050" dirty="0">
+              <a:solidFill>
+                <a:srgbClr val="7030A0"/>
+              </a:solidFill>
+            </a:endParaRPr>
+          </a:p>
+        </p:txBody>
+      </p:sp>
+      <p:sp>
+        <p:nvSpPr>
+          <p:cNvPr id="77" name="Flowchart: Decision 96">
+            <a:extLst>
+              <a:ext uri="{FF2B5EF4-FFF2-40B4-BE49-F238E27FC236}">
+                <a16:creationId xmlns:a16="http://schemas.microsoft.com/office/drawing/2014/main" id="{104978FB-68D3-4E5C-8C33-A360971138BA}"/>
+              </a:ext>
+            </a:extLst>
+          </p:cNvPr>
+          <p:cNvSpPr/>
+          <p:nvPr/>
+        </p:nvSpPr>
+        <p:spPr>
+          <a:xfrm>
+            <a:off x="7016488" y="4205711"/>
+            <a:ext cx="236048" cy="173380"/>
+          </a:xfrm>
+          <a:prstGeom prst="flowChartDecision">
+            <a:avLst/>
+          </a:prstGeom>
+          <a:solidFill>
+            <a:srgbClr val="7030A0"/>
+          </a:solidFill>
+          <a:ln w="19050">
+            <a:solidFill>
+              <a:srgbClr val="7030A0"/>
+            </a:solidFill>
+          </a:ln>
+          <a:effectLst/>
+        </p:spPr>
+        <p:style>
+          <a:lnRef idx="1">
+            <a:schemeClr val="accent6"/>
+          </a:lnRef>
+          <a:fillRef idx="2">
+            <a:schemeClr val="accent6"/>
+          </a:fillRef>
+          <a:effectRef idx="1">
+            <a:schemeClr val="accent6"/>
+          </a:effectRef>
+          <a:fontRef idx="minor">
+            <a:schemeClr val="dk1"/>
+          </a:fontRef>
+        </p:style>
+        <p:txBody>
+          <a:bodyPr rtlCol="0" anchor="ctr"/>
+          <a:lstStyle/>
+          <a:p>
+            <a:pPr algn="ctr"/>
+            <a:endParaRPr lang="en-US" sz="1050"/>
+          </a:p>
+        </p:txBody>
+      </p:sp>
+      <p:cxnSp>
+        <p:nvCxnSpPr>
+          <p:cNvPr id="87" name="Elbow Connector 78">
+            <a:extLst>
+              <a:ext uri="{FF2B5EF4-FFF2-40B4-BE49-F238E27FC236}">
+                <a16:creationId xmlns:a16="http://schemas.microsoft.com/office/drawing/2014/main" id="{37EE51BA-BEAC-41A7-A1CF-33AF8D799BEA}"/>
+              </a:ext>
+            </a:extLst>
+          </p:cNvPr>
+          <p:cNvCxnSpPr>
+            <a:cxnSpLocks/>
+            <a:stCxn id="77" idx="3"/>
+            <a:endCxn id="88" idx="1"/>
+          </p:cNvCxnSpPr>
+          <p:nvPr/>
+        </p:nvCxnSpPr>
+        <p:spPr>
+          <a:xfrm flipV="1">
+            <a:off x="7252536" y="4040169"/>
+            <a:ext cx="437861" cy="252232"/>
+          </a:xfrm>
+          <a:prstGeom prst="bentConnector3">
+            <a:avLst>
+              <a:gd name="adj1" fmla="val 50000"/>
+            </a:avLst>
+          </a:prstGeom>
+          <a:ln w="19050">
+            <a:solidFill>
+              <a:srgbClr val="7030A0"/>
+            </a:solidFill>
+            <a:headEnd type="none" w="med" len="med"/>
+            <a:tailEnd type="arrow" w="med" len="med"/>
+          </a:ln>
+          <a:effectLst/>
+        </p:spPr>
+        <p:style>
+          <a:lnRef idx="1">
+            <a:schemeClr val="accent2"/>
+          </a:lnRef>
+          <a:fillRef idx="2">
+            <a:schemeClr val="accent2"/>
+          </a:fillRef>
+          <a:effectRef idx="1">
+            <a:schemeClr val="accent2"/>
+          </a:effectRef>
+          <a:fontRef idx="minor">
+            <a:schemeClr val="dk1"/>
+          </a:fontRef>
+        </p:style>
+      </p:cxnSp>
+      <p:sp>
+        <p:nvSpPr>
+          <p:cNvPr id="88" name="Rectangle 8">
+            <a:extLst>
+              <a:ext uri="{FF2B5EF4-FFF2-40B4-BE49-F238E27FC236}">
+                <a16:creationId xmlns:a16="http://schemas.microsoft.com/office/drawing/2014/main" id="{B4BCE750-24E6-436D-8415-0C431453A8AC}"/>
+              </a:ext>
+            </a:extLst>
+          </p:cNvPr>
+          <p:cNvSpPr/>
+          <p:nvPr/>
+        </p:nvSpPr>
+        <p:spPr>
+          <a:xfrm>
+            <a:off x="7690397" y="3897277"/>
+            <a:ext cx="708186" cy="285783"/>
+          </a:xfrm>
+          <a:prstGeom prst="rect">
+            <a:avLst/>
+          </a:prstGeom>
+          <a:ln w="19050">
+            <a:solidFill>
+              <a:srgbClr val="7030A0"/>
+            </a:solidFill>
+          </a:ln>
+          <a:effectLst/>
+        </p:spPr>
+        <p:style>
+          <a:lnRef idx="1">
+            <a:schemeClr val="accent4"/>
+          </a:lnRef>
+          <a:fillRef idx="2">
+            <a:schemeClr val="accent4"/>
+          </a:fillRef>
+          <a:effectRef idx="1">
+            <a:schemeClr val="accent4"/>
+          </a:effectRef>
+          <a:fontRef idx="minor">
+            <a:schemeClr val="dk1"/>
+          </a:fontRef>
+        </p:style>
+        <p:txBody>
+          <a:bodyPr rtlCol="0" anchor="ctr"/>
+          <a:lstStyle/>
+          <a:p>
+            <a:pPr algn="ctr"/>
+            <a:r>
+              <a:rPr lang="en-US" sz="1050" dirty="0">
+                <a:solidFill>
+                  <a:srgbClr val="7030A0"/>
+                </a:solidFill>
+              </a:rPr>
+              <a:t>Event Name</a:t>
+            </a:r>
+            <a:endParaRPr lang="en-SG" sz="1050" dirty="0">
+              <a:solidFill>
+                <a:srgbClr val="7030A0"/>
+              </a:solidFill>
+            </a:endParaRPr>
+          </a:p>
+        </p:txBody>
+      </p:sp>
+      <p:sp>
+        <p:nvSpPr>
+          <p:cNvPr id="89" name="Rectangle 8">
+            <a:extLst>
+              <a:ext uri="{FF2B5EF4-FFF2-40B4-BE49-F238E27FC236}">
+                <a16:creationId xmlns:a16="http://schemas.microsoft.com/office/drawing/2014/main" id="{3CA604DB-695E-4D48-8F08-5DFAC22DC85F}"/>
+              </a:ext>
+            </a:extLst>
+          </p:cNvPr>
+          <p:cNvSpPr/>
+          <p:nvPr/>
+        </p:nvSpPr>
+        <p:spPr>
+          <a:xfrm>
+            <a:off x="7684643" y="4216158"/>
+            <a:ext cx="713939" cy="285783"/>
+          </a:xfrm>
+          <a:prstGeom prst="rect">
+            <a:avLst/>
+          </a:prstGeom>
+          <a:ln w="19050">
+            <a:solidFill>
+              <a:srgbClr val="7030A0"/>
+            </a:solidFill>
+          </a:ln>
+          <a:effectLst/>
+        </p:spPr>
+        <p:style>
+          <a:lnRef idx="1">
+            <a:schemeClr val="accent4"/>
+          </a:lnRef>
+          <a:fillRef idx="2">
+            <a:schemeClr val="accent4"/>
+          </a:fillRef>
+          <a:effectRef idx="1">
+            <a:schemeClr val="accent4"/>
+          </a:effectRef>
+          <a:fontRef idx="minor">
+            <a:schemeClr val="dk1"/>
+          </a:fontRef>
+        </p:style>
+        <p:txBody>
+          <a:bodyPr rtlCol="0" anchor="ctr"/>
+          <a:lstStyle/>
+          <a:p>
+            <a:pPr algn="ctr"/>
+            <a:r>
+              <a:rPr lang="en-SG" sz="1050" dirty="0">
+                <a:solidFill>
+                  <a:srgbClr val="7030A0"/>
+                </a:solidFill>
+              </a:rPr>
+              <a:t>Date</a:t>
+            </a:r>
+          </a:p>
+        </p:txBody>
+      </p:sp>
+      <p:sp>
+        <p:nvSpPr>
+          <p:cNvPr id="90" name="Rectangle 8">
+            <a:extLst>
+              <a:ext uri="{FF2B5EF4-FFF2-40B4-BE49-F238E27FC236}">
+                <a16:creationId xmlns:a16="http://schemas.microsoft.com/office/drawing/2014/main" id="{6CBA117F-E09F-438D-A940-36EC1504DBA1}"/>
+              </a:ext>
+            </a:extLst>
+          </p:cNvPr>
+          <p:cNvSpPr/>
+          <p:nvPr/>
+        </p:nvSpPr>
+        <p:spPr>
+          <a:xfrm>
+            <a:off x="7684644" y="4550465"/>
+            <a:ext cx="708186" cy="285783"/>
+          </a:xfrm>
+          <a:prstGeom prst="rect">
+            <a:avLst/>
+          </a:prstGeom>
+          <a:ln w="19050">
+            <a:solidFill>
+              <a:srgbClr val="7030A0"/>
+            </a:solidFill>
+          </a:ln>
+          <a:effectLst/>
+        </p:spPr>
+        <p:style>
+          <a:lnRef idx="1">
+            <a:schemeClr val="accent4"/>
+          </a:lnRef>
+          <a:fillRef idx="2">
+            <a:schemeClr val="accent4"/>
+          </a:fillRef>
+          <a:effectRef idx="1">
+            <a:schemeClr val="accent4"/>
+          </a:effectRef>
+          <a:fontRef idx="minor">
+            <a:schemeClr val="dk1"/>
+          </a:fontRef>
+        </p:style>
+        <p:txBody>
+          <a:bodyPr rtlCol="0" anchor="ctr"/>
+          <a:lstStyle/>
+          <a:p>
+            <a:pPr algn="ctr"/>
+            <a:r>
+              <a:rPr lang="en-SG" sz="1050" dirty="0">
+                <a:solidFill>
+                  <a:srgbClr val="7030A0"/>
+                </a:solidFill>
+              </a:rPr>
+              <a:t>Start Time</a:t>
+            </a:r>
+          </a:p>
+        </p:txBody>
+      </p:sp>
+      <p:sp>
+        <p:nvSpPr>
+          <p:cNvPr id="91" name="Rectangle 8">
+            <a:extLst>
+              <a:ext uri="{FF2B5EF4-FFF2-40B4-BE49-F238E27FC236}">
+                <a16:creationId xmlns:a16="http://schemas.microsoft.com/office/drawing/2014/main" id="{0E15FE7E-DAA3-47A2-9518-3502C76AF877}"/>
+              </a:ext>
+            </a:extLst>
+          </p:cNvPr>
+          <p:cNvSpPr/>
+          <p:nvPr/>
+        </p:nvSpPr>
+        <p:spPr>
+          <a:xfrm>
+            <a:off x="7682167" y="4884772"/>
+            <a:ext cx="708186" cy="285783"/>
+          </a:xfrm>
+          <a:prstGeom prst="rect">
+            <a:avLst/>
+          </a:prstGeom>
+          <a:ln w="19050">
+            <a:solidFill>
+              <a:srgbClr val="7030A0"/>
+            </a:solidFill>
+          </a:ln>
+          <a:effectLst/>
+        </p:spPr>
+        <p:style>
+          <a:lnRef idx="1">
+            <a:schemeClr val="accent4"/>
+          </a:lnRef>
+          <a:fillRef idx="2">
+            <a:schemeClr val="accent4"/>
+          </a:fillRef>
+          <a:effectRef idx="1">
+            <a:schemeClr val="accent4"/>
+          </a:effectRef>
+          <a:fontRef idx="minor">
+            <a:schemeClr val="dk1"/>
+          </a:fontRef>
+        </p:style>
+        <p:txBody>
+          <a:bodyPr rtlCol="0" anchor="ctr"/>
+          <a:lstStyle/>
+          <a:p>
+            <a:pPr algn="ctr"/>
+            <a:r>
+              <a:rPr lang="en-SG" sz="1050" dirty="0">
+                <a:solidFill>
+                  <a:srgbClr val="7030A0"/>
+                </a:solidFill>
+              </a:rPr>
+              <a:t>End Time</a:t>
+            </a:r>
+          </a:p>
+        </p:txBody>
+      </p:sp>
+      <p:sp>
+        <p:nvSpPr>
+          <p:cNvPr id="92" name="Rectangle 8">
+            <a:extLst>
+              <a:ext uri="{FF2B5EF4-FFF2-40B4-BE49-F238E27FC236}">
+                <a16:creationId xmlns:a16="http://schemas.microsoft.com/office/drawing/2014/main" id="{3B00DE64-DE53-4C3B-9B0C-C13C5A00A998}"/>
+              </a:ext>
+            </a:extLst>
+          </p:cNvPr>
+          <p:cNvSpPr/>
+          <p:nvPr/>
+        </p:nvSpPr>
+        <p:spPr>
+          <a:xfrm>
+            <a:off x="7679041" y="5218670"/>
+            <a:ext cx="708186" cy="285783"/>
+          </a:xfrm>
+          <a:prstGeom prst="rect">
+            <a:avLst/>
+          </a:prstGeom>
+          <a:ln w="19050">
+            <a:solidFill>
+              <a:srgbClr val="7030A0"/>
+            </a:solidFill>
+          </a:ln>
+          <a:effectLst/>
+        </p:spPr>
+        <p:style>
+          <a:lnRef idx="1">
+            <a:schemeClr val="accent4"/>
+          </a:lnRef>
+          <a:fillRef idx="2">
+            <a:schemeClr val="accent4"/>
+          </a:fillRef>
+          <a:effectRef idx="1">
+            <a:schemeClr val="accent4"/>
+          </a:effectRef>
+          <a:fontRef idx="minor">
+            <a:schemeClr val="dk1"/>
+          </a:fontRef>
+        </p:style>
+        <p:txBody>
+          <a:bodyPr rtlCol="0" anchor="ctr"/>
+          <a:lstStyle/>
+          <a:p>
+            <a:pPr algn="ctr"/>
+            <a:r>
+              <a:rPr lang="en-US" sz="800" dirty="0">
+                <a:solidFill>
+                  <a:srgbClr val="7030A0"/>
+                </a:solidFill>
+              </a:rPr>
+              <a:t>Description</a:t>
+            </a:r>
+            <a:endParaRPr lang="en-SG" sz="800" dirty="0">
+              <a:solidFill>
+                <a:srgbClr val="7030A0"/>
+              </a:solidFill>
+            </a:endParaRPr>
+          </a:p>
+        </p:txBody>
+      </p:sp>
+      <p:sp>
+        <p:nvSpPr>
+          <p:cNvPr id="93" name="Rectangle 8">
+            <a:extLst>
+              <a:ext uri="{FF2B5EF4-FFF2-40B4-BE49-F238E27FC236}">
+                <a16:creationId xmlns:a16="http://schemas.microsoft.com/office/drawing/2014/main" id="{7EB1B8FD-60E7-48B3-B3FF-C190718AAE3D}"/>
+              </a:ext>
+            </a:extLst>
+          </p:cNvPr>
+          <p:cNvSpPr/>
+          <p:nvPr/>
+        </p:nvSpPr>
+        <p:spPr>
+          <a:xfrm>
+            <a:off x="7712397" y="1894510"/>
+            <a:ext cx="708186" cy="285783"/>
+          </a:xfrm>
+          <a:prstGeom prst="rect">
+            <a:avLst/>
+          </a:prstGeom>
+          <a:ln w="19050">
+            <a:solidFill>
+              <a:srgbClr val="7030A0"/>
+            </a:solidFill>
+          </a:ln>
+          <a:effectLst/>
+        </p:spPr>
+        <p:style>
+          <a:lnRef idx="1">
+            <a:schemeClr val="accent4"/>
+          </a:lnRef>
+          <a:fillRef idx="2">
+            <a:schemeClr val="accent4"/>
+          </a:fillRef>
+          <a:effectRef idx="1">
+            <a:schemeClr val="accent4"/>
+          </a:effectRef>
+          <a:fontRef idx="minor">
+            <a:schemeClr val="dk1"/>
+          </a:fontRef>
+        </p:style>
+        <p:txBody>
+          <a:bodyPr rtlCol="0" anchor="ctr"/>
+          <a:lstStyle/>
+          <a:p>
+            <a:pPr algn="ctr"/>
+            <a:r>
+              <a:rPr lang="en-US" sz="800" dirty="0">
+                <a:solidFill>
+                  <a:srgbClr val="7030A0"/>
+                </a:solidFill>
+              </a:rPr>
+              <a:t>Attendance</a:t>
+            </a:r>
+            <a:endParaRPr lang="en-SG" sz="800" dirty="0">
+              <a:solidFill>
+                <a:srgbClr val="7030A0"/>
+              </a:solidFill>
+            </a:endParaRPr>
+          </a:p>
+        </p:txBody>
+      </p:sp>
+      <p:cxnSp>
+        <p:nvCxnSpPr>
+          <p:cNvPr id="96" name="Elbow Connector 78">
+            <a:extLst>
+              <a:ext uri="{FF2B5EF4-FFF2-40B4-BE49-F238E27FC236}">
+                <a16:creationId xmlns:a16="http://schemas.microsoft.com/office/drawing/2014/main" id="{4D6EE491-C242-4D5A-B58F-44F419E59B83}"/>
+              </a:ext>
+            </a:extLst>
+          </p:cNvPr>
+          <p:cNvCxnSpPr>
+            <a:cxnSpLocks/>
+            <a:endCxn id="93" idx="1"/>
+          </p:cNvCxnSpPr>
+          <p:nvPr/>
+        </p:nvCxnSpPr>
+        <p:spPr>
+          <a:xfrm rot="5400000" flipH="1" flipV="1">
+            <a:off x="7336282" y="2196316"/>
+            <a:ext cx="535028" cy="217201"/>
+          </a:xfrm>
+          <a:prstGeom prst="bentConnector2">
+            <a:avLst/>
+          </a:prstGeom>
+          <a:ln w="19050">
+            <a:solidFill>
+              <a:srgbClr val="7030A0"/>
+            </a:solidFill>
+            <a:headEnd type="none" w="med" len="med"/>
+            <a:tailEnd type="arrow" w="med" len="med"/>
+          </a:ln>
+          <a:effectLst/>
+        </p:spPr>
+        <p:style>
+          <a:lnRef idx="1">
+            <a:schemeClr val="accent2"/>
+          </a:lnRef>
+          <a:fillRef idx="2">
+            <a:schemeClr val="accent2"/>
+          </a:fillRef>
+          <a:effectRef idx="1">
+            <a:schemeClr val="accent2"/>
+          </a:effectRef>
+          <a:fontRef idx="minor">
+            <a:schemeClr val="dk1"/>
+          </a:fontRef>
+        </p:style>
+      </p:cxnSp>
+      <p:cxnSp>
+        <p:nvCxnSpPr>
+          <p:cNvPr id="101" name="Elbow Connector 78">
+            <a:extLst>
+              <a:ext uri="{FF2B5EF4-FFF2-40B4-BE49-F238E27FC236}">
+                <a16:creationId xmlns:a16="http://schemas.microsoft.com/office/drawing/2014/main" id="{ADEA14AC-867D-48A1-9623-9DD867C06908}"/>
+              </a:ext>
+            </a:extLst>
+          </p:cNvPr>
+          <p:cNvCxnSpPr>
+            <a:cxnSpLocks/>
+            <a:endCxn id="89" idx="1"/>
+          </p:cNvCxnSpPr>
+          <p:nvPr/>
+        </p:nvCxnSpPr>
+        <p:spPr>
+          <a:xfrm>
+            <a:off x="7466243" y="4292401"/>
+            <a:ext cx="218400" cy="66649"/>
+          </a:xfrm>
+          <a:prstGeom prst="bentConnector3">
+            <a:avLst>
+              <a:gd name="adj1" fmla="val 50000"/>
+            </a:avLst>
+          </a:prstGeom>
+          <a:ln w="19050">
+            <a:solidFill>
+              <a:srgbClr val="7030A0"/>
+            </a:solidFill>
+            <a:headEnd type="none" w="med" len="med"/>
+            <a:tailEnd type="arrow" w="med" len="med"/>
+          </a:ln>
+          <a:effectLst/>
+        </p:spPr>
+        <p:style>
+          <a:lnRef idx="1">
+            <a:schemeClr val="accent2"/>
+          </a:lnRef>
+          <a:fillRef idx="2">
+            <a:schemeClr val="accent2"/>
+          </a:fillRef>
+          <a:effectRef idx="1">
+            <a:schemeClr val="accent2"/>
+          </a:effectRef>
+          <a:fontRef idx="minor">
+            <a:schemeClr val="dk1"/>
+          </a:fontRef>
+        </p:style>
+      </p:cxnSp>
+      <p:cxnSp>
+        <p:nvCxnSpPr>
+          <p:cNvPr id="102" name="Elbow Connector 78">
+            <a:extLst>
+              <a:ext uri="{FF2B5EF4-FFF2-40B4-BE49-F238E27FC236}">
+                <a16:creationId xmlns:a16="http://schemas.microsoft.com/office/drawing/2014/main" id="{1D0E6FB5-8214-42A9-A8A9-67D0791D07A7}"/>
+              </a:ext>
+            </a:extLst>
+          </p:cNvPr>
+          <p:cNvCxnSpPr>
+            <a:cxnSpLocks/>
+            <a:endCxn id="90" idx="1"/>
+          </p:cNvCxnSpPr>
+          <p:nvPr/>
+        </p:nvCxnSpPr>
+        <p:spPr>
+          <a:xfrm rot="16200000" flipH="1">
+            <a:off x="7374965" y="4383678"/>
+            <a:ext cx="400956" cy="218401"/>
+          </a:xfrm>
+          <a:prstGeom prst="bentConnector2">
+            <a:avLst/>
+          </a:prstGeom>
+          <a:ln w="19050">
+            <a:solidFill>
+              <a:srgbClr val="7030A0"/>
+            </a:solidFill>
+            <a:headEnd type="none" w="med" len="med"/>
+            <a:tailEnd type="arrow" w="med" len="med"/>
+          </a:ln>
+          <a:effectLst/>
+        </p:spPr>
+        <p:style>
+          <a:lnRef idx="1">
+            <a:schemeClr val="accent2"/>
+          </a:lnRef>
+          <a:fillRef idx="2">
+            <a:schemeClr val="accent2"/>
+          </a:fillRef>
+          <a:effectRef idx="1">
+            <a:schemeClr val="accent2"/>
+          </a:effectRef>
+          <a:fontRef idx="minor">
+            <a:schemeClr val="dk1"/>
+          </a:fontRef>
+        </p:style>
+      </p:cxnSp>
+      <p:cxnSp>
+        <p:nvCxnSpPr>
+          <p:cNvPr id="108" name="Elbow Connector 78">
+            <a:extLst>
+              <a:ext uri="{FF2B5EF4-FFF2-40B4-BE49-F238E27FC236}">
+                <a16:creationId xmlns:a16="http://schemas.microsoft.com/office/drawing/2014/main" id="{5D2F2607-3754-4444-A614-0925B76155AE}"/>
+              </a:ext>
+            </a:extLst>
+          </p:cNvPr>
+          <p:cNvCxnSpPr>
+            <a:cxnSpLocks/>
+          </p:cNvCxnSpPr>
+          <p:nvPr/>
+        </p:nvCxnSpPr>
+        <p:spPr>
+          <a:xfrm rot="16200000" flipH="1">
+            <a:off x="7374965" y="4728900"/>
+            <a:ext cx="400956" cy="218401"/>
+          </a:xfrm>
+          <a:prstGeom prst="bentConnector2">
+            <a:avLst/>
+          </a:prstGeom>
+          <a:ln w="19050">
+            <a:solidFill>
+              <a:srgbClr val="7030A0"/>
+            </a:solidFill>
+            <a:headEnd type="none" w="med" len="med"/>
+            <a:tailEnd type="arrow" w="med" len="med"/>
+          </a:ln>
+          <a:effectLst/>
+        </p:spPr>
+        <p:style>
+          <a:lnRef idx="1">
+            <a:schemeClr val="accent2"/>
+          </a:lnRef>
+          <a:fillRef idx="2">
+            <a:schemeClr val="accent2"/>
+          </a:fillRef>
+          <a:effectRef idx="1">
+            <a:schemeClr val="accent2"/>
+          </a:effectRef>
+          <a:fontRef idx="minor">
+            <a:schemeClr val="dk1"/>
+          </a:fontRef>
+        </p:style>
+      </p:cxnSp>
+      <p:cxnSp>
+        <p:nvCxnSpPr>
+          <p:cNvPr id="109" name="Elbow Connector 78">
+            <a:extLst>
+              <a:ext uri="{FF2B5EF4-FFF2-40B4-BE49-F238E27FC236}">
+                <a16:creationId xmlns:a16="http://schemas.microsoft.com/office/drawing/2014/main" id="{8B207750-A13D-473D-A32A-665C6904926C}"/>
+              </a:ext>
+            </a:extLst>
+          </p:cNvPr>
+          <p:cNvCxnSpPr>
+            <a:cxnSpLocks/>
+          </p:cNvCxnSpPr>
+          <p:nvPr/>
+        </p:nvCxnSpPr>
+        <p:spPr>
+          <a:xfrm rot="16200000" flipH="1">
+            <a:off x="7374965" y="5066254"/>
+            <a:ext cx="400956" cy="218401"/>
+          </a:xfrm>
+          <a:prstGeom prst="bentConnector2">
+            <a:avLst/>
+          </a:prstGeom>
+          <a:ln w="19050">
+            <a:solidFill>
+              <a:srgbClr val="7030A0"/>
+            </a:solidFill>
+            <a:headEnd type="none" w="med" len="med"/>
+            <a:tailEnd type="arrow" w="med" len="med"/>
+          </a:ln>
+          <a:effectLst/>
+        </p:spPr>
+        <p:style>
+          <a:lnRef idx="1">
+            <a:schemeClr val="accent2"/>
+          </a:lnRef>
+          <a:fillRef idx="2">
+            <a:schemeClr val="accent2"/>
+          </a:fillRef>
+          <a:effectRef idx="1">
+            <a:schemeClr val="accent2"/>
+          </a:effectRef>
+          <a:fontRef idx="minor">
+            <a:schemeClr val="dk1"/>
+          </a:fontRef>
+        </p:style>
+      </p:cxnSp>
+      <p:sp>
+        <p:nvSpPr>
+          <p:cNvPr id="110" name="Flowchart: Decision 96">
+            <a:extLst>
+              <a:ext uri="{FF2B5EF4-FFF2-40B4-BE49-F238E27FC236}">
+                <a16:creationId xmlns:a16="http://schemas.microsoft.com/office/drawing/2014/main" id="{BFACDDA8-5FF0-4E22-8933-0487E4660331}"/>
+              </a:ext>
+            </a:extLst>
+          </p:cNvPr>
+          <p:cNvSpPr/>
+          <p:nvPr/>
+        </p:nvSpPr>
+        <p:spPr>
+          <a:xfrm>
+            <a:off x="5913011" y="4216282"/>
+            <a:ext cx="177832" cy="152236"/>
+          </a:xfrm>
+          <a:prstGeom prst="flowChartDecision">
+            <a:avLst/>
+          </a:prstGeom>
+          <a:noFill/>
+          <a:ln w="19050">
+            <a:solidFill>
+              <a:srgbClr val="7030A0"/>
+            </a:solidFill>
+          </a:ln>
+          <a:effectLst/>
+        </p:spPr>
+        <p:style>
+          <a:lnRef idx="1">
+            <a:schemeClr val="accent6"/>
+          </a:lnRef>
+          <a:fillRef idx="2">
+            <a:schemeClr val="accent6"/>
+          </a:fillRef>
+          <a:effectRef idx="1">
+            <a:schemeClr val="accent6"/>
+          </a:effectRef>
+          <a:fontRef idx="minor">
+            <a:schemeClr val="dk1"/>
+          </a:fontRef>
+        </p:style>
+        <p:txBody>
+          <a:bodyPr rtlCol="0" anchor="ctr"/>
+          <a:lstStyle/>
+          <a:p>
+            <a:pPr algn="ctr"/>
+            <a:endParaRPr lang="en-US" sz="1050"/>
+          </a:p>
+        </p:txBody>
+      </p:sp>
+      <p:cxnSp>
+        <p:nvCxnSpPr>
+          <p:cNvPr id="111" name="Elbow Connector 63">
+            <a:extLst>
+              <a:ext uri="{FF2B5EF4-FFF2-40B4-BE49-F238E27FC236}">
+                <a16:creationId xmlns:a16="http://schemas.microsoft.com/office/drawing/2014/main" id="{C1ECEBAC-9297-40D5-983D-DA71FEF5E1A3}"/>
+              </a:ext>
+            </a:extLst>
+          </p:cNvPr>
+          <p:cNvCxnSpPr>
+            <a:cxnSpLocks/>
+          </p:cNvCxnSpPr>
+          <p:nvPr/>
+        </p:nvCxnSpPr>
+        <p:spPr>
+          <a:xfrm>
+            <a:off x="6094799" y="4281318"/>
+            <a:ext cx="188405" cy="22164"/>
+          </a:xfrm>
+          <a:prstGeom prst="bentConnector3">
+            <a:avLst>
+              <a:gd name="adj1" fmla="val -2000"/>
+            </a:avLst>
+          </a:prstGeom>
+          <a:ln w="19050">
+            <a:solidFill>
+              <a:srgbClr val="7030A0"/>
+            </a:solidFill>
+            <a:headEnd type="none" w="med" len="med"/>
+            <a:tailEnd type="arrow" w="med" len="med"/>
+          </a:ln>
+          <a:effectLst/>
+        </p:spPr>
+        <p:style>
+          <a:lnRef idx="1">
+            <a:schemeClr val="accent2"/>
+          </a:lnRef>
+          <a:fillRef idx="2">
+            <a:schemeClr val="accent2"/>
+          </a:fillRef>
+          <a:effectRef idx="1">
+            <a:schemeClr val="accent2"/>
+          </a:effectRef>
+          <a:fontRef idx="minor">
+            <a:schemeClr val="dk1"/>
+          </a:fontRef>
+        </p:style>
+      </p:cxnSp>
+      <p:cxnSp>
+        <p:nvCxnSpPr>
+          <p:cNvPr id="117" name="Straight Arrow Connector 116">
+            <a:extLst>
+              <a:ext uri="{FF2B5EF4-FFF2-40B4-BE49-F238E27FC236}">
+                <a16:creationId xmlns:a16="http://schemas.microsoft.com/office/drawing/2014/main" id="{76B1A7FD-216B-4CF7-850E-DA227B096508}"/>
+              </a:ext>
+            </a:extLst>
+          </p:cNvPr>
+          <p:cNvCxnSpPr>
+            <a:cxnSpLocks/>
+          </p:cNvCxnSpPr>
+          <p:nvPr/>
+        </p:nvCxnSpPr>
+        <p:spPr>
+          <a:xfrm>
+            <a:off x="4334933" y="4277044"/>
+            <a:ext cx="367678" cy="12320"/>
+          </a:xfrm>
+          <a:prstGeom prst="straightConnector1">
+            <a:avLst/>
+          </a:prstGeom>
+          <a:ln w="19050">
+            <a:solidFill>
+              <a:srgbClr val="7030A0"/>
+            </a:solidFill>
+            <a:headEnd type="none" w="med" len="med"/>
+            <a:tailEnd type="arrow" w="med" len="med"/>
+          </a:ln>
+          <a:effectLst/>
+        </p:spPr>
+        <p:style>
+          <a:lnRef idx="1">
+            <a:schemeClr val="accent2"/>
+          </a:lnRef>
+          <a:fillRef idx="2">
+            <a:schemeClr val="accent2"/>
+          </a:fillRef>
+          <a:effectRef idx="1">
+            <a:schemeClr val="accent2"/>
+          </a:effectRef>
+          <a:fontRef idx="minor">
+            <a:schemeClr val="dk1"/>
+          </a:fontRef>
+        </p:style>
+      </p:cxnSp>
+      <p:sp>
+        <p:nvSpPr>
+          <p:cNvPr id="123" name="Flowchart: Decision 96">
+            <a:extLst>
+              <a:ext uri="{FF2B5EF4-FFF2-40B4-BE49-F238E27FC236}">
+                <a16:creationId xmlns:a16="http://schemas.microsoft.com/office/drawing/2014/main" id="{1AC8A65B-FF86-456D-A5F1-80950B255660}"/>
+              </a:ext>
+            </a:extLst>
+          </p:cNvPr>
+          <p:cNvSpPr/>
+          <p:nvPr/>
+        </p:nvSpPr>
+        <p:spPr>
+          <a:xfrm>
+            <a:off x="4311932" y="4185669"/>
+            <a:ext cx="236048" cy="173380"/>
+          </a:xfrm>
+          <a:prstGeom prst="flowChartDecision">
+            <a:avLst/>
+          </a:prstGeom>
+          <a:solidFill>
+            <a:srgbClr val="7030A0"/>
+          </a:solidFill>
+          <a:ln w="19050">
+            <a:solidFill>
+              <a:srgbClr val="7030A0"/>
+            </a:solidFill>
+          </a:ln>
+          <a:effectLst/>
+        </p:spPr>
+        <p:style>
+          <a:lnRef idx="1">
+            <a:schemeClr val="accent6"/>
+          </a:lnRef>
+          <a:fillRef idx="2">
+            <a:schemeClr val="accent6"/>
+          </a:fillRef>
+          <a:effectRef idx="1">
+            <a:schemeClr val="accent6"/>
+          </a:effectRef>
+          <a:fontRef idx="minor">
+            <a:schemeClr val="dk1"/>
+          </a:fontRef>
+        </p:style>
+        <p:txBody>
+          <a:bodyPr rtlCol="0" anchor="ctr"/>
+          <a:lstStyle/>
+          <a:p>
+            <a:pPr algn="ctr"/>
+            <a:endParaRPr lang="en-US" sz="1050"/>
+          </a:p>
+        </p:txBody>
+      </p:sp>
+      <p:sp>
+        <p:nvSpPr>
+          <p:cNvPr id="126" name="TextBox 125">
+            <a:extLst>
+              <a:ext uri="{FF2B5EF4-FFF2-40B4-BE49-F238E27FC236}">
+                <a16:creationId xmlns:a16="http://schemas.microsoft.com/office/drawing/2014/main" id="{B63DDD95-DEC8-4660-B491-7A37147C79DA}"/>
+              </a:ext>
+            </a:extLst>
+          </p:cNvPr>
+          <p:cNvSpPr txBox="1"/>
+          <p:nvPr/>
+        </p:nvSpPr>
+        <p:spPr>
+          <a:xfrm>
+            <a:off x="4424143" y="4347145"/>
+            <a:ext cx="189257" cy="178683"/>
+          </a:xfrm>
+          <a:prstGeom prst="rect">
+            <a:avLst/>
+          </a:prstGeom>
+          <a:noFill/>
+        </p:spPr>
+        <p:txBody>
+          <a:bodyPr wrap="square" lIns="0" tIns="0" rIns="0" bIns="0" rtlCol="0">
+            <a:noAutofit/>
+          </a:bodyPr>
+          <a:lstStyle/>
+          <a:p>
+            <a:pPr algn="ctr"/>
+            <a:r>
+              <a:rPr lang="en-US" sz="1100" dirty="0">
+                <a:solidFill>
+                  <a:srgbClr val="7030A0"/>
+                </a:solidFill>
+              </a:rPr>
+              <a:t>1</a:t>
+            </a:r>
+            <a:endParaRPr lang="en-SG" sz="1100" dirty="0">
+              <a:solidFill>
+                <a:srgbClr val="7030A0"/>
+              </a:solidFill>
+            </a:endParaRPr>
+          </a:p>
+        </p:txBody>
+      </p:sp>
+      <p:sp>
+        <p:nvSpPr>
+          <p:cNvPr id="127" name="TextBox 126">
+            <a:extLst>
+              <a:ext uri="{FF2B5EF4-FFF2-40B4-BE49-F238E27FC236}">
+                <a16:creationId xmlns:a16="http://schemas.microsoft.com/office/drawing/2014/main" id="{E57DE42C-FE69-4587-9336-9720ED577ED5}"/>
+              </a:ext>
+            </a:extLst>
+          </p:cNvPr>
+          <p:cNvSpPr txBox="1"/>
+          <p:nvPr/>
+        </p:nvSpPr>
+        <p:spPr>
+          <a:xfrm>
+            <a:off x="6135256" y="4411658"/>
+            <a:ext cx="189257" cy="178683"/>
+          </a:xfrm>
+          <a:prstGeom prst="rect">
+            <a:avLst/>
+          </a:prstGeom>
+          <a:noFill/>
+        </p:spPr>
+        <p:txBody>
+          <a:bodyPr wrap="square" lIns="0" tIns="0" rIns="0" bIns="0" rtlCol="0">
+            <a:noAutofit/>
+          </a:bodyPr>
+          <a:lstStyle/>
+          <a:p>
+            <a:pPr algn="ctr"/>
+            <a:r>
+              <a:rPr lang="en-US" sz="1100" dirty="0">
+                <a:solidFill>
+                  <a:srgbClr val="7030A0"/>
+                </a:solidFill>
+              </a:rPr>
+              <a:t>*</a:t>
+            </a:r>
+            <a:endParaRPr lang="en-SG" sz="1100" dirty="0">
+              <a:solidFill>
+                <a:srgbClr val="7030A0"/>
+              </a:solidFill>
+            </a:endParaRPr>
+          </a:p>
+        </p:txBody>
+      </p:sp>
+      <p:sp>
+        <p:nvSpPr>
+          <p:cNvPr id="128" name="TextBox 127">
+            <a:extLst>
+              <a:ext uri="{FF2B5EF4-FFF2-40B4-BE49-F238E27FC236}">
+                <a16:creationId xmlns:a16="http://schemas.microsoft.com/office/drawing/2014/main" id="{DF9D935E-5821-4BAC-8A29-F5A642115749}"/>
+              </a:ext>
+            </a:extLst>
+          </p:cNvPr>
+          <p:cNvSpPr txBox="1"/>
+          <p:nvPr/>
+        </p:nvSpPr>
+        <p:spPr>
+          <a:xfrm>
+            <a:off x="2548974" y="4307893"/>
+            <a:ext cx="170110" cy="137542"/>
+          </a:xfrm>
+          <a:prstGeom prst="rect">
+            <a:avLst/>
+          </a:prstGeom>
+          <a:noFill/>
+        </p:spPr>
+        <p:txBody>
+          <a:bodyPr wrap="square" lIns="0" tIns="0" rIns="0" bIns="0" rtlCol="0">
+            <a:noAutofit/>
+          </a:bodyPr>
+          <a:lstStyle/>
+          <a:p>
+            <a:pPr algn="ctr"/>
+            <a:r>
+              <a:rPr lang="en-US" sz="1100" dirty="0">
+                <a:solidFill>
+                  <a:srgbClr val="7030A0"/>
+                </a:solidFill>
+              </a:rPr>
+              <a:t>1</a:t>
+            </a:r>
+            <a:endParaRPr lang="en-SG" sz="1100" dirty="0">
+              <a:solidFill>
+                <a:srgbClr val="7030A0"/>
+              </a:solidFill>
+            </a:endParaRPr>
+          </a:p>
+        </p:txBody>
+      </p:sp>
+      <p:cxnSp>
+        <p:nvCxnSpPr>
+          <p:cNvPr id="129" name="Straight Arrow Connector 128">
+            <a:extLst>
+              <a:ext uri="{FF2B5EF4-FFF2-40B4-BE49-F238E27FC236}">
+                <a16:creationId xmlns:a16="http://schemas.microsoft.com/office/drawing/2014/main" id="{130C2868-DBC6-417F-9FEA-31F347117F79}"/>
+              </a:ext>
+            </a:extLst>
+          </p:cNvPr>
+          <p:cNvCxnSpPr>
+            <a:cxnSpLocks/>
+            <a:endCxn id="72" idx="1"/>
+          </p:cNvCxnSpPr>
+          <p:nvPr/>
+        </p:nvCxnSpPr>
+        <p:spPr>
+          <a:xfrm>
+            <a:off x="2630890" y="4262224"/>
+            <a:ext cx="194390" cy="0"/>
+          </a:xfrm>
+          <a:prstGeom prst="straightConnector1">
+            <a:avLst/>
+          </a:prstGeom>
+          <a:ln w="19050">
+            <a:solidFill>
+              <a:srgbClr val="7030A0"/>
+            </a:solidFill>
+            <a:headEnd type="none" w="med" len="med"/>
+            <a:tailEnd type="arrow" w="med" len="med"/>
+          </a:ln>
+          <a:effectLst/>
+        </p:spPr>
+        <p:style>
+          <a:lnRef idx="1">
+            <a:schemeClr val="accent2"/>
+          </a:lnRef>
+          <a:fillRef idx="2">
+            <a:schemeClr val="accent2"/>
+          </a:fillRef>
+          <a:effectRef idx="1">
+            <a:schemeClr val="accent2"/>
+          </a:effectRef>
+          <a:fontRef idx="minor">
+            <a:schemeClr val="dk1"/>
+          </a:fontRef>
+        </p:style>
+      </p:cxnSp>
+      <p:sp>
+        <p:nvSpPr>
+          <p:cNvPr id="130" name="TextBox 129">
+            <a:extLst>
+              <a:ext uri="{FF2B5EF4-FFF2-40B4-BE49-F238E27FC236}">
+                <a16:creationId xmlns:a16="http://schemas.microsoft.com/office/drawing/2014/main" id="{99586821-88DA-44CF-806C-7E02A15AC662}"/>
+              </a:ext>
+            </a:extLst>
+          </p:cNvPr>
+          <p:cNvSpPr txBox="1"/>
+          <p:nvPr/>
+        </p:nvSpPr>
+        <p:spPr>
+          <a:xfrm>
+            <a:off x="6667770" y="4509113"/>
+            <a:ext cx="189257" cy="178683"/>
+          </a:xfrm>
+          <a:prstGeom prst="rect">
+            <a:avLst/>
+          </a:prstGeom>
+          <a:noFill/>
+        </p:spPr>
+        <p:txBody>
+          <a:bodyPr wrap="square" lIns="0" tIns="0" rIns="0" bIns="0" rtlCol="0">
+            <a:noAutofit/>
+          </a:bodyPr>
+          <a:lstStyle/>
+          <a:p>
+            <a:pPr algn="ctr"/>
+            <a:r>
+              <a:rPr lang="en-US" sz="1100" dirty="0">
+                <a:solidFill>
+                  <a:srgbClr val="7030A0"/>
+                </a:solidFill>
+              </a:rPr>
+              <a:t>1</a:t>
+            </a:r>
+            <a:endParaRPr lang="en-SG" sz="1100" dirty="0">
+              <a:solidFill>
+                <a:srgbClr val="7030A0"/>
+              </a:solidFill>
+            </a:endParaRPr>
+          </a:p>
+        </p:txBody>
+      </p:sp>
+      <p:cxnSp>
+        <p:nvCxnSpPr>
+          <p:cNvPr id="131" name="Elbow Connector 106">
+            <a:extLst>
+              <a:ext uri="{FF2B5EF4-FFF2-40B4-BE49-F238E27FC236}">
+                <a16:creationId xmlns:a16="http://schemas.microsoft.com/office/drawing/2014/main" id="{6D5A5E2F-FB74-4CEB-B55C-61284D9AE523}"/>
+              </a:ext>
+            </a:extLst>
+          </p:cNvPr>
+          <p:cNvCxnSpPr>
+            <a:cxnSpLocks/>
+            <a:stCxn id="9" idx="1"/>
+            <a:endCxn id="74" idx="2"/>
+          </p:cNvCxnSpPr>
+          <p:nvPr/>
+        </p:nvCxnSpPr>
+        <p:spPr>
+          <a:xfrm rot="5400000" flipH="1" flipV="1">
+            <a:off x="4317962" y="2363451"/>
+            <a:ext cx="224875" cy="4434936"/>
+          </a:xfrm>
+          <a:prstGeom prst="bentConnector3">
+            <a:avLst>
+              <a:gd name="adj1" fmla="val -1656"/>
+            </a:avLst>
+          </a:prstGeom>
+          <a:ln w="19050">
+            <a:solidFill>
+              <a:srgbClr val="7030A0"/>
+            </a:solidFill>
+            <a:prstDash val="solid"/>
+            <a:headEnd type="none" w="med" len="med"/>
+            <a:tailEnd type="arrow" w="med" len="med"/>
+          </a:ln>
+          <a:effectLst/>
+        </p:spPr>
+        <p:style>
+          <a:lnRef idx="1">
+            <a:schemeClr val="accent2"/>
+          </a:lnRef>
+          <a:fillRef idx="2">
+            <a:schemeClr val="accent2"/>
+          </a:fillRef>
+          <a:effectRef idx="1">
+            <a:schemeClr val="accent2"/>
+          </a:effectRef>
+          <a:fontRef idx="minor">
+            <a:schemeClr val="dk1"/>
+          </a:fontRef>
+        </p:style>
+      </p:cxnSp>
+      <p:sp>
+        <p:nvSpPr>
+          <p:cNvPr id="132" name="TextBox 131">
+            <a:extLst>
+              <a:ext uri="{FF2B5EF4-FFF2-40B4-BE49-F238E27FC236}">
+                <a16:creationId xmlns:a16="http://schemas.microsoft.com/office/drawing/2014/main" id="{86094C0B-25A4-4536-8301-D55F1B58033F}"/>
+              </a:ext>
+            </a:extLst>
+          </p:cNvPr>
+          <p:cNvSpPr txBox="1"/>
+          <p:nvPr/>
+        </p:nvSpPr>
+        <p:spPr>
+          <a:xfrm>
+            <a:off x="5562600" y="4732036"/>
+            <a:ext cx="881018" cy="261610"/>
+          </a:xfrm>
+          <a:prstGeom prst="rect">
+            <a:avLst/>
+          </a:prstGeom>
+          <a:noFill/>
+        </p:spPr>
+        <p:txBody>
+          <a:bodyPr wrap="square" rtlCol="0">
+            <a:spAutoFit/>
+          </a:bodyPr>
+          <a:lstStyle/>
+          <a:p>
+            <a:pPr algn="r"/>
+            <a:r>
+              <a:rPr lang="en-US" sz="1100" dirty="0">
+                <a:solidFill>
+                  <a:srgbClr val="7030A0"/>
+                </a:solidFill>
+              </a:rPr>
+              <a:t>filtered list</a:t>
+            </a:r>
+            <a:endParaRPr lang="en-SG" sz="1100" dirty="0">
+              <a:solidFill>
+                <a:srgbClr val="7030A0"/>
+              </a:solidFill>
+            </a:endParaRPr>
+          </a:p>
+        </p:txBody>
+      </p:sp>
+      <p:sp>
+        <p:nvSpPr>
+          <p:cNvPr id="133" name="Rectangle 8">
+            <a:extLst>
+              <a:ext uri="{FF2B5EF4-FFF2-40B4-BE49-F238E27FC236}">
+                <a16:creationId xmlns:a16="http://schemas.microsoft.com/office/drawing/2014/main" id="{55358396-7F0C-4F1C-B118-0C44C17C8E16}"/>
+              </a:ext>
+            </a:extLst>
+          </p:cNvPr>
+          <p:cNvSpPr/>
+          <p:nvPr/>
+        </p:nvSpPr>
+        <p:spPr>
+          <a:xfrm>
+            <a:off x="3127364" y="4971755"/>
+            <a:ext cx="1060683" cy="364396"/>
+          </a:xfrm>
+          <a:prstGeom prst="rect">
+            <a:avLst/>
+          </a:prstGeom>
+          <a:ln w="19050">
+            <a:solidFill>
+              <a:srgbClr val="7030A0"/>
+            </a:solidFill>
+          </a:ln>
+          <a:effectLst/>
+        </p:spPr>
+        <p:style>
+          <a:lnRef idx="1">
+            <a:schemeClr val="accent4"/>
+          </a:lnRef>
+          <a:fillRef idx="2">
+            <a:schemeClr val="accent4"/>
+          </a:fillRef>
+          <a:effectRef idx="1">
+            <a:schemeClr val="accent4"/>
+          </a:effectRef>
+          <a:fontRef idx="minor">
+            <a:schemeClr val="dk1"/>
+          </a:fontRef>
+        </p:style>
+        <p:txBody>
+          <a:bodyPr rtlCol="0" anchor="ctr"/>
+          <a:lstStyle/>
+          <a:p>
+            <a:pPr algn="ctr"/>
+            <a:r>
+              <a:rPr lang="en-US" sz="1050" dirty="0">
+                <a:solidFill>
+                  <a:srgbClr val="7030A0"/>
+                </a:solidFill>
+              </a:rPr>
+              <a:t>Calendar</a:t>
+            </a:r>
+            <a:endParaRPr lang="en-SG" sz="1050" dirty="0">
+              <a:solidFill>
+                <a:srgbClr val="7030A0"/>
+              </a:solidFill>
+            </a:endParaRPr>
+          </a:p>
+        </p:txBody>
+      </p:sp>
+      <p:sp>
+        <p:nvSpPr>
+          <p:cNvPr id="134" name="Isosceles Triangle 102">
+            <a:extLst>
+              <a:ext uri="{FF2B5EF4-FFF2-40B4-BE49-F238E27FC236}">
+                <a16:creationId xmlns:a16="http://schemas.microsoft.com/office/drawing/2014/main" id="{3DF0399E-B762-4A42-8CA6-2B5E38247924}"/>
+              </a:ext>
+            </a:extLst>
+          </p:cNvPr>
+          <p:cNvSpPr/>
+          <p:nvPr/>
+        </p:nvSpPr>
+        <p:spPr>
+          <a:xfrm flipV="1">
+            <a:off x="3429365" y="4814693"/>
+            <a:ext cx="282387" cy="157062"/>
+          </a:xfrm>
+          <a:prstGeom prst="triangle">
+            <a:avLst/>
+          </a:prstGeom>
+          <a:ln w="19050">
+            <a:solidFill>
+              <a:srgbClr val="7030A0"/>
+            </a:solidFill>
+          </a:ln>
+          <a:effectLst/>
+        </p:spPr>
+        <p:style>
+          <a:lnRef idx="1">
+            <a:schemeClr val="accent4"/>
+          </a:lnRef>
+          <a:fillRef idx="2">
+            <a:schemeClr val="accent4"/>
+          </a:fillRef>
+          <a:effectRef idx="1">
+            <a:schemeClr val="accent4"/>
+          </a:effectRef>
+          <a:fontRef idx="minor">
+            <a:schemeClr val="dk1"/>
+          </a:fontRef>
+        </p:style>
+        <p:txBody>
+          <a:bodyPr rtlCol="0" anchor="ctr"/>
+          <a:lstStyle/>
+          <a:p>
+            <a:pPr algn="ctr"/>
+            <a:endParaRPr lang="en-SG" sz="1050" b="1">
+              <a:solidFill>
+                <a:srgbClr val="92D050"/>
+              </a:solidFill>
+            </a:endParaRPr>
+          </a:p>
+        </p:txBody>
+      </p:sp>
+      <p:cxnSp>
+        <p:nvCxnSpPr>
+          <p:cNvPr id="135" name="Elbow Connector 63">
+            <a:extLst>
+              <a:ext uri="{FF2B5EF4-FFF2-40B4-BE49-F238E27FC236}">
+                <a16:creationId xmlns:a16="http://schemas.microsoft.com/office/drawing/2014/main" id="{31C7948F-F26A-4EFB-B069-EF6D887F0EAF}"/>
+              </a:ext>
+            </a:extLst>
+          </p:cNvPr>
+          <p:cNvCxnSpPr>
+            <a:cxnSpLocks/>
+            <a:stCxn id="134" idx="3"/>
+            <a:endCxn id="72" idx="2"/>
+          </p:cNvCxnSpPr>
+          <p:nvPr/>
+        </p:nvCxnSpPr>
+        <p:spPr>
+          <a:xfrm rot="5400000" flipH="1" flipV="1">
+            <a:off x="3378039" y="4622173"/>
+            <a:ext cx="385041" cy="1"/>
+          </a:xfrm>
+          <a:prstGeom prst="bentConnector3">
+            <a:avLst>
+              <a:gd name="adj1" fmla="val 50000"/>
+            </a:avLst>
+          </a:prstGeom>
+          <a:ln w="19050">
+            <a:solidFill>
+              <a:srgbClr val="7030A0"/>
+            </a:solidFill>
+            <a:prstDash val="sysDot"/>
+            <a:headEnd type="none" w="med" len="med"/>
+            <a:tailEnd type="none" w="med" len="med"/>
+          </a:ln>
+          <a:effectLst/>
+        </p:spPr>
+        <p:style>
+          <a:lnRef idx="1">
+            <a:schemeClr val="accent2"/>
+          </a:lnRef>
+          <a:fillRef idx="2">
+            <a:schemeClr val="accent2"/>
+          </a:fillRef>
+          <a:effectRef idx="1">
+            <a:schemeClr val="accent2"/>
+          </a:effectRef>
+          <a:fontRef idx="minor">
+            <a:schemeClr val="dk1"/>
+          </a:fontRef>
+        </p:style>
+      </p:cxnSp>
+      <p:sp>
+        <p:nvSpPr>
+          <p:cNvPr id="141" name="Rectangle 8">
+            <a:extLst>
+              <a:ext uri="{FF2B5EF4-FFF2-40B4-BE49-F238E27FC236}">
+                <a16:creationId xmlns:a16="http://schemas.microsoft.com/office/drawing/2014/main" id="{AE04C129-BC90-4D96-8158-570D3976CC26}"/>
+              </a:ext>
+            </a:extLst>
+          </p:cNvPr>
+          <p:cNvSpPr/>
+          <p:nvPr/>
+        </p:nvSpPr>
+        <p:spPr>
+          <a:xfrm>
+            <a:off x="1254631" y="4971755"/>
+            <a:ext cx="1443661" cy="364396"/>
+          </a:xfrm>
+          <a:prstGeom prst="rect">
+            <a:avLst/>
+          </a:prstGeom>
+          <a:ln w="19050">
+            <a:solidFill>
+              <a:srgbClr val="7030A0"/>
+            </a:solidFill>
+          </a:ln>
+          <a:effectLst/>
+        </p:spPr>
+        <p:style>
+          <a:lnRef idx="1">
+            <a:schemeClr val="accent4"/>
+          </a:lnRef>
+          <a:fillRef idx="2">
+            <a:schemeClr val="accent4"/>
+          </a:fillRef>
+          <a:effectRef idx="1">
+            <a:schemeClr val="accent4"/>
+          </a:effectRef>
+          <a:fontRef idx="minor">
+            <a:schemeClr val="dk1"/>
+          </a:fontRef>
+        </p:style>
+        <p:txBody>
+          <a:bodyPr rtlCol="0" anchor="ctr"/>
+          <a:lstStyle/>
+          <a:p>
+            <a:pPr algn="ctr"/>
+            <a:r>
+              <a:rPr lang="en-US" sz="1050" dirty="0">
+                <a:solidFill>
+                  <a:srgbClr val="7030A0"/>
+                </a:solidFill>
+              </a:rPr>
+              <a:t>&lt;&lt;interface&gt;&gt;</a:t>
+            </a:r>
+            <a:br>
+              <a:rPr lang="en-US" sz="1050" dirty="0">
+                <a:solidFill>
+                  <a:srgbClr val="7030A0"/>
+                </a:solidFill>
+              </a:rPr>
+            </a:br>
+            <a:r>
+              <a:rPr lang="en-US" sz="1050" dirty="0" err="1">
+                <a:solidFill>
+                  <a:srgbClr val="7030A0"/>
+                </a:solidFill>
+              </a:rPr>
+              <a:t>ReadOnlyCalendar</a:t>
+            </a:r>
+            <a:endParaRPr lang="en-SG" sz="1050" dirty="0">
+              <a:solidFill>
+                <a:srgbClr val="7030A0"/>
+              </a:solidFill>
+            </a:endParaRPr>
+          </a:p>
+        </p:txBody>
+      </p:sp>
+      <p:sp>
+        <p:nvSpPr>
+          <p:cNvPr id="142" name="Isosceles Triangle 102">
+            <a:extLst>
+              <a:ext uri="{FF2B5EF4-FFF2-40B4-BE49-F238E27FC236}">
+                <a16:creationId xmlns:a16="http://schemas.microsoft.com/office/drawing/2014/main" id="{514CD965-7087-4A68-A59A-ED4E0D6564FE}"/>
+              </a:ext>
+            </a:extLst>
+          </p:cNvPr>
+          <p:cNvSpPr/>
+          <p:nvPr/>
+        </p:nvSpPr>
+        <p:spPr>
+          <a:xfrm rot="16200000">
+            <a:off x="2669276" y="5060245"/>
+            <a:ext cx="271014" cy="187417"/>
+          </a:xfrm>
+          <a:prstGeom prst="triangle">
+            <a:avLst>
+              <a:gd name="adj" fmla="val 44517"/>
+            </a:avLst>
+          </a:prstGeom>
+          <a:solidFill>
+            <a:schemeClr val="accent4">
+              <a:lumMod val="20000"/>
+              <a:lumOff val="80000"/>
+            </a:schemeClr>
+          </a:solidFill>
+          <a:ln w="19050">
+            <a:solidFill>
+              <a:srgbClr val="7030A0"/>
+            </a:solidFill>
+          </a:ln>
+          <a:effectLst/>
+        </p:spPr>
+        <p:style>
+          <a:lnRef idx="1">
+            <a:schemeClr val="accent6"/>
+          </a:lnRef>
+          <a:fillRef idx="2">
+            <a:schemeClr val="accent6"/>
+          </a:fillRef>
+          <a:effectRef idx="1">
+            <a:schemeClr val="accent6"/>
+          </a:effectRef>
+          <a:fontRef idx="minor">
+            <a:schemeClr val="dk1"/>
+          </a:fontRef>
+        </p:style>
+        <p:txBody>
+          <a:bodyPr rtlCol="0" anchor="ctr"/>
+          <a:lstStyle/>
+          <a:p>
+            <a:pPr algn="ctr"/>
+            <a:endParaRPr lang="en-SG" sz="1050"/>
+          </a:p>
+        </p:txBody>
+      </p:sp>
+      <p:cxnSp>
+        <p:nvCxnSpPr>
+          <p:cNvPr id="143" name="Elbow Connector 63">
+            <a:extLst>
+              <a:ext uri="{FF2B5EF4-FFF2-40B4-BE49-F238E27FC236}">
+                <a16:creationId xmlns:a16="http://schemas.microsoft.com/office/drawing/2014/main" id="{564C0BD1-824B-4C86-B95D-D291E344C58E}"/>
+              </a:ext>
+            </a:extLst>
+          </p:cNvPr>
+          <p:cNvCxnSpPr>
+            <a:cxnSpLocks/>
+            <a:stCxn id="142" idx="3"/>
+            <a:endCxn id="133" idx="1"/>
+          </p:cNvCxnSpPr>
+          <p:nvPr/>
+        </p:nvCxnSpPr>
+        <p:spPr>
+          <a:xfrm flipV="1">
+            <a:off x="2898492" y="5153953"/>
+            <a:ext cx="228872" cy="14861"/>
           </a:xfrm>
           <a:prstGeom prst="bentConnector3">
             <a:avLst>

</xml_diff>

<commit_message>
Update UML architecture diagrams
</commit_message>
<xml_diff>
--- a/docs/diagrams/ModelComponentClassDiagram.pptx
+++ b/docs/diagrams/ModelComponentClassDiagram.pptx
@@ -7438,6 +7438,51 @@
           </a:fontRef>
         </p:style>
       </p:cxnSp>
+      <p:sp>
+        <p:nvSpPr>
+          <p:cNvPr id="82" name="TextBox 81">
+            <a:extLst>
+              <a:ext uri="{FF2B5EF4-FFF2-40B4-BE49-F238E27FC236}">
+                <a16:creationId xmlns:a16="http://schemas.microsoft.com/office/drawing/2014/main" id="{AFC53F55-ACAA-4EE7-A161-0B5832459650}"/>
+              </a:ext>
+            </a:extLst>
+          </p:cNvPr>
+          <p:cNvSpPr txBox="1"/>
+          <p:nvPr/>
+        </p:nvSpPr>
+        <p:spPr>
+          <a:xfrm>
+            <a:off x="7509167" y="5236389"/>
+            <a:ext cx="189257" cy="178683"/>
+          </a:xfrm>
+          <a:prstGeom prst="rect">
+            <a:avLst/>
+          </a:prstGeom>
+          <a:noFill/>
+        </p:spPr>
+        <p:txBody>
+          <a:bodyPr wrap="square" lIns="0" tIns="0" rIns="0" bIns="0" rtlCol="0">
+            <a:noAutofit/>
+          </a:bodyPr>
+          <a:lstStyle/>
+          <a:p>
+            <a:pPr algn="ctr"/>
+            <a:r>
+              <a:rPr lang="en-US" sz="1100" dirty="0">
+                <a:solidFill>
+                  <a:srgbClr val="7030A0"/>
+                </a:solidFill>
+              </a:rPr>
+              <a:t>*</a:t>
+            </a:r>
+            <a:endParaRPr lang="en-SG" sz="1100" dirty="0">
+              <a:solidFill>
+                <a:srgbClr val="7030A0"/>
+              </a:solidFill>
+            </a:endParaRPr>
+          </a:p>
+        </p:txBody>
+      </p:sp>
     </p:spTree>
     <p:extLst>
       <p:ext uri="{BB962C8B-B14F-4D97-AF65-F5344CB8AC3E}">

</xml_diff>